<commit_message>
re-add changes in parts 1,3,4
</commit_message>
<xml_diff>
--- a/Slides/FHDS_Data_Analysis_Part3.pptx
+++ b/Slides/FHDS_Data_Analysis_Part3.pptx
@@ -36,7 +36,7 @@
     <p:sldId id="6059" r:id="rId30"/>
     <p:sldId id="6058" r:id="rId31"/>
     <p:sldId id="6062" r:id="rId32"/>
-    <p:sldId id="358" r:id="rId33"/>
+    <p:sldId id="5971" r:id="rId33"/>
   </p:sldIdLst>
   <p:sldSz cx="18288000" cy="10287000"/>
   <p:notesSz cx="6858000" cy="9144000"/>
@@ -414,7 +414,7 @@
           <a:p>
             <a:fld id="{B7268E1E-0E44-426D-905E-8AD9B19D2182}" type="datetimeFigureOut">
               <a:rPr lang="cs-CZ" smtClean="0"/>
-              <a:t>10.01.2024</a:t>
+              <a:t>15.01.2024</a:t>
             </a:fld>
             <a:endParaRPr lang="cs-CZ"/>
           </a:p>
@@ -2940,7 +2940,7 @@
           <a:bodyPr/>
           <a:lstStyle/>
           <a:p>
-            <a:endParaRPr lang="en-US" dirty="0"/>
+            <a:endParaRPr lang="en-GB"/>
           </a:p>
         </p:txBody>
       </p:sp>
@@ -2970,7 +2970,7 @@
     </p:spTree>
     <p:extLst>
       <p:ext uri="{BB962C8B-B14F-4D97-AF65-F5344CB8AC3E}">
-        <p14:creationId xmlns:p14="http://schemas.microsoft.com/office/powerpoint/2010/main" val="3357097894"/>
+        <p14:creationId xmlns:p14="http://schemas.microsoft.com/office/powerpoint/2010/main" val="3936407274"/>
       </p:ext>
     </p:extLst>
   </p:cSld>
@@ -3938,7 +3938,7 @@
             <a:fld id="{1D8BD707-D9CF-40AE-B4C6-C98DA3205C09}" type="datetimeFigureOut">
               <a:rPr lang="en-US" smtClean="0"/>
               <a:pPr/>
-              <a:t>1/10/2024</a:t>
+              <a:t>1/15/2024</a:t>
             </a:fld>
             <a:endParaRPr lang="en-US"/>
           </a:p>
@@ -4103,7 +4103,7 @@
             <a:fld id="{1D8BD707-D9CF-40AE-B4C6-C98DA3205C09}" type="datetimeFigureOut">
               <a:rPr lang="en-US" smtClean="0"/>
               <a:pPr/>
-              <a:t>1/10/2024</a:t>
+              <a:t>1/15/2024</a:t>
             </a:fld>
             <a:endParaRPr lang="en-US"/>
           </a:p>
@@ -4278,7 +4278,7 @@
             <a:fld id="{1D8BD707-D9CF-40AE-B4C6-C98DA3205C09}" type="datetimeFigureOut">
               <a:rPr lang="en-US" smtClean="0"/>
               <a:pPr/>
-              <a:t>1/10/2024</a:t>
+              <a:t>1/15/2024</a:t>
             </a:fld>
             <a:endParaRPr lang="en-US"/>
           </a:p>
@@ -4443,7 +4443,7 @@
             <a:fld id="{1D8BD707-D9CF-40AE-B4C6-C98DA3205C09}" type="datetimeFigureOut">
               <a:rPr lang="en-US" smtClean="0"/>
               <a:pPr/>
-              <a:t>1/10/2024</a:t>
+              <a:t>1/15/2024</a:t>
             </a:fld>
             <a:endParaRPr lang="en-US"/>
           </a:p>
@@ -4685,7 +4685,7 @@
             <a:fld id="{1D8BD707-D9CF-40AE-B4C6-C98DA3205C09}" type="datetimeFigureOut">
               <a:rPr lang="en-US" smtClean="0"/>
               <a:pPr/>
-              <a:t>1/10/2024</a:t>
+              <a:t>1/15/2024</a:t>
             </a:fld>
             <a:endParaRPr lang="en-US"/>
           </a:p>
@@ -4967,7 +4967,7 @@
             <a:fld id="{1D8BD707-D9CF-40AE-B4C6-C98DA3205C09}" type="datetimeFigureOut">
               <a:rPr lang="en-US" smtClean="0"/>
               <a:pPr/>
-              <a:t>1/10/2024</a:t>
+              <a:t>1/15/2024</a:t>
             </a:fld>
             <a:endParaRPr lang="en-US"/>
           </a:p>
@@ -5383,7 +5383,7 @@
             <a:fld id="{1D8BD707-D9CF-40AE-B4C6-C98DA3205C09}" type="datetimeFigureOut">
               <a:rPr lang="en-US" smtClean="0"/>
               <a:pPr/>
-              <a:t>1/10/2024</a:t>
+              <a:t>1/15/2024</a:t>
             </a:fld>
             <a:endParaRPr lang="en-US"/>
           </a:p>
@@ -5497,7 +5497,7 @@
             <a:fld id="{1D8BD707-D9CF-40AE-B4C6-C98DA3205C09}" type="datetimeFigureOut">
               <a:rPr lang="en-US" smtClean="0"/>
               <a:pPr/>
-              <a:t>1/10/2024</a:t>
+              <a:t>1/15/2024</a:t>
             </a:fld>
             <a:endParaRPr lang="en-US"/>
           </a:p>
@@ -5589,7 +5589,7 @@
             <a:fld id="{1D8BD707-D9CF-40AE-B4C6-C98DA3205C09}" type="datetimeFigureOut">
               <a:rPr lang="en-US" smtClean="0"/>
               <a:pPr/>
-              <a:t>1/10/2024</a:t>
+              <a:t>1/15/2024</a:t>
             </a:fld>
             <a:endParaRPr lang="en-US"/>
           </a:p>
@@ -5861,7 +5861,7 @@
             <a:fld id="{1D8BD707-D9CF-40AE-B4C6-C98DA3205C09}" type="datetimeFigureOut">
               <a:rPr lang="en-US" smtClean="0"/>
               <a:pPr/>
-              <a:t>1/10/2024</a:t>
+              <a:t>1/15/2024</a:t>
             </a:fld>
             <a:endParaRPr lang="en-US"/>
           </a:p>
@@ -6110,7 +6110,7 @@
             <a:fld id="{1D8BD707-D9CF-40AE-B4C6-C98DA3205C09}" type="datetimeFigureOut">
               <a:rPr lang="en-US" smtClean="0"/>
               <a:pPr/>
-              <a:t>1/10/2024</a:t>
+              <a:t>1/15/2024</a:t>
             </a:fld>
             <a:endParaRPr lang="en-US"/>
           </a:p>
@@ -6318,7 +6318,7 @@
             <a:fld id="{1D8BD707-D9CF-40AE-B4C6-C98DA3205C09}" type="datetimeFigureOut">
               <a:rPr lang="en-US" smtClean="0"/>
               <a:pPr/>
-              <a:t>1/10/2024</a:t>
+              <a:t>1/15/2024</a:t>
             </a:fld>
             <a:endParaRPr lang="en-US"/>
           </a:p>
@@ -21798,7 +21798,7 @@
           </a:ln>
           <a:extLst>
             <a:ext uri="{C572A759-6A51-4108-AA02-DFA0A04FC94B}">
-              <ma14:wrappingTextBoxFlag xmlns:ma14="http://schemas.microsoft.com/office/mac/drawingml/2011/main" xmlns:a14="http://schemas.microsoft.com/office/drawing/2010/main" xmlns:m="http://schemas.openxmlformats.org/officeDocument/2006/math" xmlns="" val="1"/>
+              <ma14:wrappingTextBoxFlag xmlns="" xmlns:m="http://schemas.openxmlformats.org/officeDocument/2006/math" xmlns:a14="http://schemas.microsoft.com/office/drawing/2010/main" xmlns:ma14="http://schemas.microsoft.com/office/mac/drawingml/2011/main" val="1"/>
             </a:ext>
           </a:extLst>
         </p:spPr>
@@ -21853,7 +21853,7 @@
           </a:ln>
           <a:extLst>
             <a:ext uri="{C572A759-6A51-4108-AA02-DFA0A04FC94B}">
-              <ma14:wrappingTextBoxFlag xmlns:ma14="http://schemas.microsoft.com/office/mac/drawingml/2011/main" xmlns:a14="http://schemas.microsoft.com/office/drawing/2010/main" xmlns:m="http://schemas.openxmlformats.org/officeDocument/2006/math" xmlns="" val="1"/>
+              <ma14:wrappingTextBoxFlag xmlns="" xmlns:m="http://schemas.openxmlformats.org/officeDocument/2006/math" xmlns:a14="http://schemas.microsoft.com/office/drawing/2010/main" xmlns:ma14="http://schemas.microsoft.com/office/mac/drawingml/2011/main" val="1"/>
             </a:ext>
           </a:extLst>
         </p:spPr>
@@ -23127,7 +23127,7 @@
           </a:ln>
           <a:extLst>
             <a:ext uri="{C572A759-6A51-4108-AA02-DFA0A04FC94B}">
-              <ma14:wrappingTextBoxFlag xmlns:ma14="http://schemas.microsoft.com/office/mac/drawingml/2011/main" xmlns:a14="http://schemas.microsoft.com/office/drawing/2010/main" xmlns:m="http://schemas.openxmlformats.org/officeDocument/2006/math" xmlns="" val="1"/>
+              <ma14:wrappingTextBoxFlag xmlns="" xmlns:m="http://schemas.openxmlformats.org/officeDocument/2006/math" xmlns:a14="http://schemas.microsoft.com/office/drawing/2010/main" xmlns:ma14="http://schemas.microsoft.com/office/mac/drawingml/2011/main" val="1"/>
             </a:ext>
           </a:extLst>
         </p:spPr>
@@ -23307,7 +23307,7 @@
           </a:ln>
           <a:extLst>
             <a:ext uri="{C572A759-6A51-4108-AA02-DFA0A04FC94B}">
-              <ma14:wrappingTextBoxFlag xmlns:ma14="http://schemas.microsoft.com/office/mac/drawingml/2011/main" xmlns:a14="http://schemas.microsoft.com/office/drawing/2010/main" xmlns:m="http://schemas.openxmlformats.org/officeDocument/2006/math" xmlns="" val="1"/>
+              <ma14:wrappingTextBoxFlag xmlns="" xmlns:m="http://schemas.openxmlformats.org/officeDocument/2006/math" xmlns:a14="http://schemas.microsoft.com/office/drawing/2010/main" xmlns:ma14="http://schemas.microsoft.com/office/mac/drawingml/2011/main" val="1"/>
             </a:ext>
           </a:extLst>
         </p:spPr>
@@ -32059,72 +32059,111 @@
           <a:chExt cx="0" cy="0"/>
         </a:xfrm>
       </p:grpSpPr>
-      <mc:AlternateContent xmlns:mc="http://schemas.openxmlformats.org/markup-compatibility/2006" xmlns:we="http://schemas.microsoft.com/office/webextensions/webextension/2010/11" xmlns:pca="http://schemas.microsoft.com/office/powerpoint/2013/contentapp">
-        <mc:Choice Requires="we pca">
-          <p:graphicFrame>
-            <p:nvGraphicFramePr>
-              <p:cNvPr id="5" name="Add-in 4">
-                <a:extLst>
-                  <a:ext uri="{FF2B5EF4-FFF2-40B4-BE49-F238E27FC236}">
-                    <a16:creationId xmlns:a16="http://schemas.microsoft.com/office/drawing/2014/main" id="{836BC707-9937-78B5-605B-EB757213B90D}"/>
-                  </a:ext>
-                </a:extLst>
-              </p:cNvPr>
-              <p:cNvGraphicFramePr>
-                <a:graphicFrameLocks noGrp="1"/>
-              </p:cNvGraphicFramePr>
-              <p:nvPr/>
-            </p:nvGraphicFramePr>
-            <p:xfrm>
-              <a:off x="7527851" y="4001386"/>
-              <a:ext cx="9804400" cy="3810000"/>
-            </p:xfrm>
-            <a:graphic>
-              <a:graphicData uri="http://schemas.microsoft.com/office/webextensions/webextension/2010/11">
-                <we:webextensionref xmlns:we="http://schemas.microsoft.com/office/webextensions/webextension/2010/11" xmlns:r="http://schemas.openxmlformats.org/officeDocument/2006/relationships" r:id="rId3"/>
-              </a:graphicData>
-            </a:graphic>
-          </p:graphicFrame>
-        </mc:Choice>
-        <mc:Fallback xmlns="">
-          <p:pic>
-            <p:nvPicPr>
-              <p:cNvPr id="5" name="Add-in 4">
-                <a:extLst>
-                  <a:ext uri="{FF2B5EF4-FFF2-40B4-BE49-F238E27FC236}">
-                    <a16:creationId xmlns:a16="http://schemas.microsoft.com/office/drawing/2014/main" id="{836BC707-9937-78B5-605B-EB757213B90D}"/>
-                  </a:ext>
-                </a:extLst>
-              </p:cNvPr>
-              <p:cNvPicPr>
-                <a:picLocks noGrp="1" noRot="1" noChangeAspect="1" noMove="1" noResize="1" noEditPoints="1" noAdjustHandles="1" noChangeArrowheads="1" noChangeShapeType="1"/>
-              </p:cNvPicPr>
-              <p:nvPr/>
-            </p:nvPicPr>
-            <p:blipFill>
-              <a:blip r:embed="rId4"/>
-              <a:stretch>
-                <a:fillRect/>
-              </a:stretch>
-            </p:blipFill>
-            <p:spPr>
-              <a:xfrm>
-                <a:off x="7527851" y="4001386"/>
-                <a:ext cx="9804400" cy="3810000"/>
-              </a:xfrm>
-              <a:prstGeom prst="rect">
-                <a:avLst/>
-              </a:prstGeom>
-            </p:spPr>
-          </p:pic>
-        </mc:Fallback>
-      </mc:AlternateContent>
+      <p:sp>
+        <p:nvSpPr>
+          <p:cNvPr id="3" name="Rounded Rectangle 2">
+            <a:extLst>
+              <a:ext uri="{FF2B5EF4-FFF2-40B4-BE49-F238E27FC236}">
+                <a16:creationId xmlns:a16="http://schemas.microsoft.com/office/drawing/2014/main" id="{D0B1EC93-34F0-C603-BBC7-0CF25E9F7465}"/>
+              </a:ext>
+            </a:extLst>
+          </p:cNvPr>
+          <p:cNvSpPr/>
+          <p:nvPr/>
+        </p:nvSpPr>
+        <p:spPr>
+          <a:xfrm>
+            <a:off x="4479582" y="940888"/>
+            <a:ext cx="9328836" cy="1268345"/>
+          </a:xfrm>
+          <a:prstGeom prst="roundRect">
+            <a:avLst/>
+          </a:prstGeom>
+          <a:solidFill>
+            <a:srgbClr val="8EB4E3"/>
+          </a:solidFill>
+          <a:ln>
+            <a:noFill/>
+          </a:ln>
+        </p:spPr>
+        <p:style>
+          <a:lnRef idx="2">
+            <a:schemeClr val="accent1">
+              <a:shade val="50000"/>
+            </a:schemeClr>
+          </a:lnRef>
+          <a:fillRef idx="1">
+            <a:schemeClr val="accent1"/>
+          </a:fillRef>
+          <a:effectRef idx="0">
+            <a:schemeClr val="accent1"/>
+          </a:effectRef>
+          <a:fontRef idx="minor">
+            <a:schemeClr val="lt1"/>
+          </a:fontRef>
+        </p:style>
+        <p:txBody>
+          <a:bodyPr rtlCol="0" anchor="ctr"/>
+          <a:lstStyle/>
+          <a:p>
+            <a:pPr algn="ctr"/>
+            <a:endParaRPr lang="en-DK" dirty="0"/>
+          </a:p>
+        </p:txBody>
+      </p:sp>
+      <p:sp>
+        <p:nvSpPr>
+          <p:cNvPr id="4" name="TextBox 3">
+            <a:extLst>
+              <a:ext uri="{FF2B5EF4-FFF2-40B4-BE49-F238E27FC236}">
+                <a16:creationId xmlns:a16="http://schemas.microsoft.com/office/drawing/2014/main" id="{38A17956-EBB1-F584-3D1F-2401B056F67C}"/>
+              </a:ext>
+            </a:extLst>
+          </p:cNvPr>
+          <p:cNvSpPr txBox="1"/>
+          <p:nvPr/>
+        </p:nvSpPr>
+        <p:spPr>
+          <a:xfrm>
+            <a:off x="4042434" y="1104899"/>
+            <a:ext cx="10203131" cy="940322"/>
+          </a:xfrm>
+          <a:prstGeom prst="rect">
+            <a:avLst/>
+          </a:prstGeom>
+        </p:spPr>
+        <p:txBody>
+          <a:bodyPr wrap="square" lIns="0" tIns="0" rIns="0" bIns="0" rtlCol="0" anchor="t">
+            <a:spAutoFit/>
+          </a:bodyPr>
+          <a:lstStyle/>
+          <a:p>
+            <a:pPr algn="ctr">
+              <a:lnSpc>
+                <a:spcPts val="7807"/>
+              </a:lnSpc>
+              <a:spcBef>
+                <a:spcPct val="0"/>
+              </a:spcBef>
+            </a:pPr>
+            <a:r>
+              <a:rPr lang="en-US" sz="6000" b="1" dirty="0">
+                <a:solidFill>
+                  <a:schemeClr val="bg1"/>
+                </a:solidFill>
+                <a:latin typeface="Montserrat" pitchFamily="2" charset="77"/>
+              </a:rPr>
+              <a:t>BREAK</a:t>
+            </a:r>
+          </a:p>
+        </p:txBody>
+      </p:sp>
       <p:pic>
         <p:nvPicPr>
-          <p:cNvPr id="2" name="Graphic 1" descr="Sailboat with solid fill">
+          <p:cNvPr id="10" name="Picture 9" descr="A person pouring a drink into a glass&#10;&#10;Description automatically generated">
             <a:extLst>
               <a:ext uri="{FF2B5EF4-FFF2-40B4-BE49-F238E27FC236}">
-                <a16:creationId xmlns:a16="http://schemas.microsoft.com/office/drawing/2014/main" id="{B15073D4-D298-2BE3-8583-79BE39B5952A}"/>
+                <a16:creationId xmlns:a16="http://schemas.microsoft.com/office/drawing/2014/main" id="{546D00B5-AB63-69EB-ADB6-8F53E6CA19EA}"/>
               </a:ext>
             </a:extLst>
           </p:cNvPr>
@@ -32134,13 +32173,10 @@
           <p:nvPr/>
         </p:nvPicPr>
         <p:blipFill>
-          <a:blip r:embed="rId5">
+          <a:blip r:embed="rId3">
             <a:extLst>
               <a:ext uri="{28A0092B-C50C-407E-A947-70E740481C1C}">
                 <a14:useLocalDpi xmlns:a14="http://schemas.microsoft.com/office/drawing/2010/main" val="0"/>
-              </a:ext>
-              <a:ext uri="{96DAC541-7B7A-43D3-8B79-37D633B846F1}">
-                <asvg:svgBlip xmlns:asvg="http://schemas.microsoft.com/office/drawing/2016/SVG/main" r:embed="rId6"/>
               </a:ext>
             </a:extLst>
           </a:blip>
@@ -32149,9 +32185,9 @@
           </a:stretch>
         </p:blipFill>
         <p:spPr>
-          <a:xfrm rot="21009353">
-            <a:off x="164460" y="6569635"/>
-            <a:ext cx="3624239" cy="3624239"/>
+          <a:xfrm>
+            <a:off x="5867400" y="2705100"/>
+            <a:ext cx="6553200" cy="6553200"/>
           </a:xfrm>
           <a:prstGeom prst="rect">
             <a:avLst/>
@@ -32160,10 +32196,10 @@
       </p:pic>
       <p:pic>
         <p:nvPicPr>
-          <p:cNvPr id="4" name="Picture 3" descr="A blue and black logo&#10;&#10;Description automatically generated">
+          <p:cNvPr id="20" name="Picture 19" descr="A blue and black logo&#10;&#10;Description automatically generated">
             <a:extLst>
               <a:ext uri="{FF2B5EF4-FFF2-40B4-BE49-F238E27FC236}">
-                <a16:creationId xmlns:a16="http://schemas.microsoft.com/office/drawing/2014/main" id="{CEA34DF3-0EB9-F741-E5C8-39C9ED8B283F}"/>
+                <a16:creationId xmlns:a16="http://schemas.microsoft.com/office/drawing/2014/main" id="{AFEB45C6-29AE-091F-8A18-F4E6B0F4C4C9}"/>
               </a:ext>
             </a:extLst>
           </p:cNvPr>
@@ -32173,11 +32209,11 @@
           <p:nvPr/>
         </p:nvPicPr>
         <p:blipFill>
-          <a:blip r:embed="rId7" cstate="print">
+          <a:blip r:embed="rId4" cstate="print">
             <a:extLst>
               <a:ext uri="{BEBA8EAE-BF5A-486C-A8C5-ECC9F3942E4B}">
                 <a14:imgProps xmlns:a14="http://schemas.microsoft.com/office/drawing/2010/main">
-                  <a14:imgLayer r:embed="rId8">
+                  <a14:imgLayer r:embed="rId5">
                     <a14:imgEffect>
                       <a14:colorTemperature colorTemp="4700"/>
                     </a14:imgEffect>
@@ -32206,848 +32242,10 @@
           </a:prstGeom>
         </p:spPr>
       </p:pic>
-      <p:sp>
-        <p:nvSpPr>
-          <p:cNvPr id="27" name="Rounded Rectangle 26">
-            <a:extLst>
-              <a:ext uri="{FF2B5EF4-FFF2-40B4-BE49-F238E27FC236}">
-                <a16:creationId xmlns:a16="http://schemas.microsoft.com/office/drawing/2014/main" id="{8CED60F9-8199-C33D-2581-EFFEACB492C9}"/>
-              </a:ext>
-            </a:extLst>
-          </p:cNvPr>
-          <p:cNvSpPr/>
-          <p:nvPr/>
-        </p:nvSpPr>
-        <p:spPr>
-          <a:xfrm>
-            <a:off x="3276600" y="914778"/>
-            <a:ext cx="11897543" cy="1268345"/>
-          </a:xfrm>
-          <a:prstGeom prst="roundRect">
-            <a:avLst/>
-          </a:prstGeom>
-          <a:solidFill>
-            <a:srgbClr val="FCD5B5"/>
-          </a:solidFill>
-          <a:ln>
-            <a:noFill/>
-          </a:ln>
-        </p:spPr>
-        <p:style>
-          <a:lnRef idx="2">
-            <a:schemeClr val="accent1">
-              <a:shade val="50000"/>
-            </a:schemeClr>
-          </a:lnRef>
-          <a:fillRef idx="1">
-            <a:schemeClr val="accent1"/>
-          </a:fillRef>
-          <a:effectRef idx="0">
-            <a:schemeClr val="accent1"/>
-          </a:effectRef>
-          <a:fontRef idx="minor">
-            <a:schemeClr val="lt1"/>
-          </a:fontRef>
-        </p:style>
-        <p:txBody>
-          <a:bodyPr rtlCol="0" anchor="ctr"/>
-          <a:lstStyle/>
-          <a:p>
-            <a:pPr algn="ctr"/>
-            <a:endParaRPr lang="en-DK" dirty="0"/>
-          </a:p>
-        </p:txBody>
-      </p:sp>
-      <p:sp>
-        <p:nvSpPr>
-          <p:cNvPr id="28" name="TextBox 27">
-            <a:extLst>
-              <a:ext uri="{FF2B5EF4-FFF2-40B4-BE49-F238E27FC236}">
-                <a16:creationId xmlns:a16="http://schemas.microsoft.com/office/drawing/2014/main" id="{B6F23AB6-A6AD-97CB-0348-689078796C08}"/>
-              </a:ext>
-            </a:extLst>
-          </p:cNvPr>
-          <p:cNvSpPr txBox="1"/>
-          <p:nvPr/>
-        </p:nvSpPr>
-        <p:spPr>
-          <a:xfrm>
-            <a:off x="3453521" y="1078978"/>
-            <a:ext cx="11426166" cy="940322"/>
-          </a:xfrm>
-          <a:prstGeom prst="rect">
-            <a:avLst/>
-          </a:prstGeom>
-        </p:spPr>
-        <p:txBody>
-          <a:bodyPr wrap="square" lIns="0" tIns="0" rIns="0" bIns="0" rtlCol="0" anchor="t">
-            <a:spAutoFit/>
-          </a:bodyPr>
-          <a:lstStyle/>
-          <a:p>
-            <a:pPr algn="ctr">
-              <a:lnSpc>
-                <a:spcPts val="7807"/>
-              </a:lnSpc>
-              <a:spcBef>
-                <a:spcPct val="0"/>
-              </a:spcBef>
-            </a:pPr>
-            <a:r>
-              <a:rPr lang="en-US" sz="6000" b="1" dirty="0">
-                <a:solidFill>
-                  <a:srgbClr val="404040"/>
-                </a:solidFill>
-                <a:latin typeface="Montserrat" pitchFamily="2" charset="77"/>
-              </a:rPr>
-              <a:t>A BREAK IN OUR JOURNEY</a:t>
-            </a:r>
-          </a:p>
-        </p:txBody>
-      </p:sp>
-      <p:sp>
-        <p:nvSpPr>
-          <p:cNvPr id="29" name="TextBox 28">
-            <a:extLst>
-              <a:ext uri="{FF2B5EF4-FFF2-40B4-BE49-F238E27FC236}">
-                <a16:creationId xmlns:a16="http://schemas.microsoft.com/office/drawing/2014/main" id="{BEFFDD51-13A6-085F-CEEA-2F09EA58329F}"/>
-              </a:ext>
-            </a:extLst>
-          </p:cNvPr>
-          <p:cNvSpPr txBox="1"/>
-          <p:nvPr/>
-        </p:nvSpPr>
-        <p:spPr>
-          <a:xfrm>
-            <a:off x="3180522" y="357809"/>
-            <a:ext cx="184731" cy="369332"/>
-          </a:xfrm>
-          <a:prstGeom prst="rect">
-            <a:avLst/>
-          </a:prstGeom>
-          <a:noFill/>
-        </p:spPr>
-        <p:txBody>
-          <a:bodyPr wrap="none" rtlCol="0">
-            <a:spAutoFit/>
-          </a:bodyPr>
-          <a:lstStyle/>
-          <a:p>
-            <a:endParaRPr lang="en-DK" dirty="0"/>
-          </a:p>
-        </p:txBody>
-      </p:sp>
-      <p:grpSp>
-        <p:nvGrpSpPr>
-          <p:cNvPr id="32" name="Group 31">
-            <a:extLst>
-              <a:ext uri="{FF2B5EF4-FFF2-40B4-BE49-F238E27FC236}">
-                <a16:creationId xmlns:a16="http://schemas.microsoft.com/office/drawing/2014/main" id="{7D7AD0EF-D46D-47DA-1E94-58408E4F4880}"/>
-              </a:ext>
-            </a:extLst>
-          </p:cNvPr>
-          <p:cNvGrpSpPr/>
-          <p:nvPr/>
-        </p:nvGrpSpPr>
-        <p:grpSpPr>
-          <a:xfrm>
-            <a:off x="-152400" y="8953500"/>
-            <a:ext cx="17373600" cy="1524000"/>
-            <a:chOff x="-152400" y="8953500"/>
-            <a:chExt cx="17373600" cy="1524000"/>
-          </a:xfrm>
-        </p:grpSpPr>
-        <p:grpSp>
-          <p:nvGrpSpPr>
-            <p:cNvPr id="33" name="Group 32">
-              <a:extLst>
-                <a:ext uri="{FF2B5EF4-FFF2-40B4-BE49-F238E27FC236}">
-                  <a16:creationId xmlns:a16="http://schemas.microsoft.com/office/drawing/2014/main" id="{6424CF55-075A-CF47-2B80-6030AE5EB2E2}"/>
-                </a:ext>
-              </a:extLst>
-            </p:cNvPr>
-            <p:cNvGrpSpPr/>
-            <p:nvPr/>
-          </p:nvGrpSpPr>
-          <p:grpSpPr>
-            <a:xfrm>
-              <a:off x="-152400" y="8953500"/>
-              <a:ext cx="3962400" cy="1524000"/>
-              <a:chOff x="-152400" y="8953500"/>
-              <a:chExt cx="3962400" cy="1524000"/>
-            </a:xfrm>
-          </p:grpSpPr>
-          <p:pic>
-            <p:nvPicPr>
-              <p:cNvPr id="50" name="Graphic 49" descr="Wave with solid fill">
-                <a:extLst>
-                  <a:ext uri="{FF2B5EF4-FFF2-40B4-BE49-F238E27FC236}">
-                    <a16:creationId xmlns:a16="http://schemas.microsoft.com/office/drawing/2014/main" id="{E6B4FA2C-2A58-081C-BA41-B1656175DF02}"/>
-                  </a:ext>
-                </a:extLst>
-              </p:cNvPr>
-              <p:cNvPicPr>
-                <a:picLocks noChangeAspect="1"/>
-              </p:cNvPicPr>
-              <p:nvPr/>
-            </p:nvPicPr>
-            <p:blipFill>
-              <a:blip r:embed="rId9">
-                <a:extLst>
-                  <a:ext uri="{28A0092B-C50C-407E-A947-70E740481C1C}">
-                    <a14:useLocalDpi xmlns:a14="http://schemas.microsoft.com/office/drawing/2010/main" val="0"/>
-                  </a:ext>
-                  <a:ext uri="{96DAC541-7B7A-43D3-8B79-37D633B846F1}">
-                    <asvg:svgBlip xmlns:asvg="http://schemas.microsoft.com/office/drawing/2016/SVG/main" r:embed="rId10"/>
-                  </a:ext>
-                </a:extLst>
-              </a:blip>
-              <a:stretch>
-                <a:fillRect/>
-              </a:stretch>
-            </p:blipFill>
-            <p:spPr>
-              <a:xfrm>
-                <a:off x="-152400" y="8953500"/>
-                <a:ext cx="1524000" cy="1524000"/>
-              </a:xfrm>
-              <a:prstGeom prst="rect">
-                <a:avLst/>
-              </a:prstGeom>
-            </p:spPr>
-          </p:pic>
-          <p:pic>
-            <p:nvPicPr>
-              <p:cNvPr id="51" name="Graphic 50" descr="Wave with solid fill">
-                <a:extLst>
-                  <a:ext uri="{FF2B5EF4-FFF2-40B4-BE49-F238E27FC236}">
-                    <a16:creationId xmlns:a16="http://schemas.microsoft.com/office/drawing/2014/main" id="{04C46C31-4012-5D0F-0B76-912F20980A93}"/>
-                  </a:ext>
-                </a:extLst>
-              </p:cNvPr>
-              <p:cNvPicPr>
-                <a:picLocks noChangeAspect="1"/>
-              </p:cNvPicPr>
-              <p:nvPr/>
-            </p:nvPicPr>
-            <p:blipFill>
-              <a:blip r:embed="rId9">
-                <a:extLst>
-                  <a:ext uri="{28A0092B-C50C-407E-A947-70E740481C1C}">
-                    <a14:useLocalDpi xmlns:a14="http://schemas.microsoft.com/office/drawing/2010/main" val="0"/>
-                  </a:ext>
-                  <a:ext uri="{96DAC541-7B7A-43D3-8B79-37D633B846F1}">
-                    <asvg:svgBlip xmlns:asvg="http://schemas.microsoft.com/office/drawing/2016/SVG/main" r:embed="rId10"/>
-                  </a:ext>
-                </a:extLst>
-              </a:blip>
-              <a:stretch>
-                <a:fillRect/>
-              </a:stretch>
-            </p:blipFill>
-            <p:spPr>
-              <a:xfrm>
-                <a:off x="1066800" y="8953500"/>
-                <a:ext cx="1524000" cy="1524000"/>
-              </a:xfrm>
-              <a:prstGeom prst="rect">
-                <a:avLst/>
-              </a:prstGeom>
-            </p:spPr>
-          </p:pic>
-          <p:pic>
-            <p:nvPicPr>
-              <p:cNvPr id="52" name="Graphic 51" descr="Wave with solid fill">
-                <a:extLst>
-                  <a:ext uri="{FF2B5EF4-FFF2-40B4-BE49-F238E27FC236}">
-                    <a16:creationId xmlns:a16="http://schemas.microsoft.com/office/drawing/2014/main" id="{6BC0FBBD-5D30-227D-DB70-101A097AB78E}"/>
-                  </a:ext>
-                </a:extLst>
-              </p:cNvPr>
-              <p:cNvPicPr>
-                <a:picLocks noChangeAspect="1"/>
-              </p:cNvPicPr>
-              <p:nvPr/>
-            </p:nvPicPr>
-            <p:blipFill>
-              <a:blip r:embed="rId9">
-                <a:extLst>
-                  <a:ext uri="{28A0092B-C50C-407E-A947-70E740481C1C}">
-                    <a14:useLocalDpi xmlns:a14="http://schemas.microsoft.com/office/drawing/2010/main" val="0"/>
-                  </a:ext>
-                  <a:ext uri="{96DAC541-7B7A-43D3-8B79-37D633B846F1}">
-                    <asvg:svgBlip xmlns:asvg="http://schemas.microsoft.com/office/drawing/2016/SVG/main" r:embed="rId10"/>
-                  </a:ext>
-                </a:extLst>
-              </a:blip>
-              <a:stretch>
-                <a:fillRect/>
-              </a:stretch>
-            </p:blipFill>
-            <p:spPr>
-              <a:xfrm>
-                <a:off x="2286000" y="8953500"/>
-                <a:ext cx="1524000" cy="1524000"/>
-              </a:xfrm>
-              <a:prstGeom prst="rect">
-                <a:avLst/>
-              </a:prstGeom>
-            </p:spPr>
-          </p:pic>
-        </p:grpSp>
-        <p:grpSp>
-          <p:nvGrpSpPr>
-            <p:cNvPr id="34" name="Group 33">
-              <a:extLst>
-                <a:ext uri="{FF2B5EF4-FFF2-40B4-BE49-F238E27FC236}">
-                  <a16:creationId xmlns:a16="http://schemas.microsoft.com/office/drawing/2014/main" id="{25AB0F89-96ED-1264-D966-0ED610637F32}"/>
-                </a:ext>
-              </a:extLst>
-            </p:cNvPr>
-            <p:cNvGrpSpPr/>
-            <p:nvPr/>
-          </p:nvGrpSpPr>
-          <p:grpSpPr>
-            <a:xfrm>
-              <a:off x="3505200" y="8953500"/>
-              <a:ext cx="3962400" cy="1524000"/>
-              <a:chOff x="-152400" y="8953500"/>
-              <a:chExt cx="3962400" cy="1524000"/>
-            </a:xfrm>
-          </p:grpSpPr>
-          <p:pic>
-            <p:nvPicPr>
-              <p:cNvPr id="47" name="Graphic 46" descr="Wave with solid fill">
-                <a:extLst>
-                  <a:ext uri="{FF2B5EF4-FFF2-40B4-BE49-F238E27FC236}">
-                    <a16:creationId xmlns:a16="http://schemas.microsoft.com/office/drawing/2014/main" id="{82A23010-3897-68E9-350B-13B615D4ADE8}"/>
-                  </a:ext>
-                </a:extLst>
-              </p:cNvPr>
-              <p:cNvPicPr>
-                <a:picLocks noChangeAspect="1"/>
-              </p:cNvPicPr>
-              <p:nvPr/>
-            </p:nvPicPr>
-            <p:blipFill>
-              <a:blip r:embed="rId9">
-                <a:extLst>
-                  <a:ext uri="{28A0092B-C50C-407E-A947-70E740481C1C}">
-                    <a14:useLocalDpi xmlns:a14="http://schemas.microsoft.com/office/drawing/2010/main" val="0"/>
-                  </a:ext>
-                  <a:ext uri="{96DAC541-7B7A-43D3-8B79-37D633B846F1}">
-                    <asvg:svgBlip xmlns:asvg="http://schemas.microsoft.com/office/drawing/2016/SVG/main" r:embed="rId10"/>
-                  </a:ext>
-                </a:extLst>
-              </a:blip>
-              <a:stretch>
-                <a:fillRect/>
-              </a:stretch>
-            </p:blipFill>
-            <p:spPr>
-              <a:xfrm>
-                <a:off x="-152400" y="8953500"/>
-                <a:ext cx="1524000" cy="1524000"/>
-              </a:xfrm>
-              <a:prstGeom prst="rect">
-                <a:avLst/>
-              </a:prstGeom>
-            </p:spPr>
-          </p:pic>
-          <p:pic>
-            <p:nvPicPr>
-              <p:cNvPr id="48" name="Graphic 47" descr="Wave with solid fill">
-                <a:extLst>
-                  <a:ext uri="{FF2B5EF4-FFF2-40B4-BE49-F238E27FC236}">
-                    <a16:creationId xmlns:a16="http://schemas.microsoft.com/office/drawing/2014/main" id="{F2C35933-3951-08BF-DDEE-AD3F45D57722}"/>
-                  </a:ext>
-                </a:extLst>
-              </p:cNvPr>
-              <p:cNvPicPr>
-                <a:picLocks noChangeAspect="1"/>
-              </p:cNvPicPr>
-              <p:nvPr/>
-            </p:nvPicPr>
-            <p:blipFill>
-              <a:blip r:embed="rId9">
-                <a:extLst>
-                  <a:ext uri="{28A0092B-C50C-407E-A947-70E740481C1C}">
-                    <a14:useLocalDpi xmlns:a14="http://schemas.microsoft.com/office/drawing/2010/main" val="0"/>
-                  </a:ext>
-                  <a:ext uri="{96DAC541-7B7A-43D3-8B79-37D633B846F1}">
-                    <asvg:svgBlip xmlns:asvg="http://schemas.microsoft.com/office/drawing/2016/SVG/main" r:embed="rId10"/>
-                  </a:ext>
-                </a:extLst>
-              </a:blip>
-              <a:stretch>
-                <a:fillRect/>
-              </a:stretch>
-            </p:blipFill>
-            <p:spPr>
-              <a:xfrm>
-                <a:off x="1066800" y="8953500"/>
-                <a:ext cx="1524000" cy="1524000"/>
-              </a:xfrm>
-              <a:prstGeom prst="rect">
-                <a:avLst/>
-              </a:prstGeom>
-            </p:spPr>
-          </p:pic>
-          <p:pic>
-            <p:nvPicPr>
-              <p:cNvPr id="49" name="Graphic 48" descr="Wave with solid fill">
-                <a:extLst>
-                  <a:ext uri="{FF2B5EF4-FFF2-40B4-BE49-F238E27FC236}">
-                    <a16:creationId xmlns:a16="http://schemas.microsoft.com/office/drawing/2014/main" id="{0DF55FB9-82F4-EFF5-F8C8-F3E222825783}"/>
-                  </a:ext>
-                </a:extLst>
-              </p:cNvPr>
-              <p:cNvPicPr>
-                <a:picLocks noChangeAspect="1"/>
-              </p:cNvPicPr>
-              <p:nvPr/>
-            </p:nvPicPr>
-            <p:blipFill>
-              <a:blip r:embed="rId9">
-                <a:extLst>
-                  <a:ext uri="{28A0092B-C50C-407E-A947-70E740481C1C}">
-                    <a14:useLocalDpi xmlns:a14="http://schemas.microsoft.com/office/drawing/2010/main" val="0"/>
-                  </a:ext>
-                  <a:ext uri="{96DAC541-7B7A-43D3-8B79-37D633B846F1}">
-                    <asvg:svgBlip xmlns:asvg="http://schemas.microsoft.com/office/drawing/2016/SVG/main" r:embed="rId10"/>
-                  </a:ext>
-                </a:extLst>
-              </a:blip>
-              <a:stretch>
-                <a:fillRect/>
-              </a:stretch>
-            </p:blipFill>
-            <p:spPr>
-              <a:xfrm>
-                <a:off x="2286000" y="8953500"/>
-                <a:ext cx="1524000" cy="1524000"/>
-              </a:xfrm>
-              <a:prstGeom prst="rect">
-                <a:avLst/>
-              </a:prstGeom>
-            </p:spPr>
-          </p:pic>
-        </p:grpSp>
-        <p:grpSp>
-          <p:nvGrpSpPr>
-            <p:cNvPr id="35" name="Group 34">
-              <a:extLst>
-                <a:ext uri="{FF2B5EF4-FFF2-40B4-BE49-F238E27FC236}">
-                  <a16:creationId xmlns:a16="http://schemas.microsoft.com/office/drawing/2014/main" id="{467C3D86-F123-81AF-E027-68757B107D5D}"/>
-                </a:ext>
-              </a:extLst>
-            </p:cNvPr>
-            <p:cNvGrpSpPr/>
-            <p:nvPr/>
-          </p:nvGrpSpPr>
-          <p:grpSpPr>
-            <a:xfrm>
-              <a:off x="7162800" y="8953500"/>
-              <a:ext cx="3962400" cy="1524000"/>
-              <a:chOff x="-152400" y="8953500"/>
-              <a:chExt cx="3962400" cy="1524000"/>
-            </a:xfrm>
-          </p:grpSpPr>
-          <p:pic>
-            <p:nvPicPr>
-              <p:cNvPr id="44" name="Graphic 43" descr="Wave with solid fill">
-                <a:extLst>
-                  <a:ext uri="{FF2B5EF4-FFF2-40B4-BE49-F238E27FC236}">
-                    <a16:creationId xmlns:a16="http://schemas.microsoft.com/office/drawing/2014/main" id="{0BD2BB4A-09E8-0303-F0B4-323FDF5F35EF}"/>
-                  </a:ext>
-                </a:extLst>
-              </p:cNvPr>
-              <p:cNvPicPr>
-                <a:picLocks noChangeAspect="1"/>
-              </p:cNvPicPr>
-              <p:nvPr/>
-            </p:nvPicPr>
-            <p:blipFill>
-              <a:blip r:embed="rId9">
-                <a:extLst>
-                  <a:ext uri="{28A0092B-C50C-407E-A947-70E740481C1C}">
-                    <a14:useLocalDpi xmlns:a14="http://schemas.microsoft.com/office/drawing/2010/main" val="0"/>
-                  </a:ext>
-                  <a:ext uri="{96DAC541-7B7A-43D3-8B79-37D633B846F1}">
-                    <asvg:svgBlip xmlns:asvg="http://schemas.microsoft.com/office/drawing/2016/SVG/main" r:embed="rId10"/>
-                  </a:ext>
-                </a:extLst>
-              </a:blip>
-              <a:stretch>
-                <a:fillRect/>
-              </a:stretch>
-            </p:blipFill>
-            <p:spPr>
-              <a:xfrm>
-                <a:off x="-152400" y="8953500"/>
-                <a:ext cx="1524000" cy="1524000"/>
-              </a:xfrm>
-              <a:prstGeom prst="rect">
-                <a:avLst/>
-              </a:prstGeom>
-            </p:spPr>
-          </p:pic>
-          <p:pic>
-            <p:nvPicPr>
-              <p:cNvPr id="45" name="Graphic 44" descr="Wave with solid fill">
-                <a:extLst>
-                  <a:ext uri="{FF2B5EF4-FFF2-40B4-BE49-F238E27FC236}">
-                    <a16:creationId xmlns:a16="http://schemas.microsoft.com/office/drawing/2014/main" id="{E2BBBFBE-CAFF-569E-BD88-9F6B7F542EB5}"/>
-                  </a:ext>
-                </a:extLst>
-              </p:cNvPr>
-              <p:cNvPicPr>
-                <a:picLocks noChangeAspect="1"/>
-              </p:cNvPicPr>
-              <p:nvPr/>
-            </p:nvPicPr>
-            <p:blipFill>
-              <a:blip r:embed="rId9">
-                <a:extLst>
-                  <a:ext uri="{28A0092B-C50C-407E-A947-70E740481C1C}">
-                    <a14:useLocalDpi xmlns:a14="http://schemas.microsoft.com/office/drawing/2010/main" val="0"/>
-                  </a:ext>
-                  <a:ext uri="{96DAC541-7B7A-43D3-8B79-37D633B846F1}">
-                    <asvg:svgBlip xmlns:asvg="http://schemas.microsoft.com/office/drawing/2016/SVG/main" r:embed="rId10"/>
-                  </a:ext>
-                </a:extLst>
-              </a:blip>
-              <a:stretch>
-                <a:fillRect/>
-              </a:stretch>
-            </p:blipFill>
-            <p:spPr>
-              <a:xfrm>
-                <a:off x="1066800" y="8953500"/>
-                <a:ext cx="1524000" cy="1524000"/>
-              </a:xfrm>
-              <a:prstGeom prst="rect">
-                <a:avLst/>
-              </a:prstGeom>
-            </p:spPr>
-          </p:pic>
-          <p:pic>
-            <p:nvPicPr>
-              <p:cNvPr id="46" name="Graphic 45" descr="Wave with solid fill">
-                <a:extLst>
-                  <a:ext uri="{FF2B5EF4-FFF2-40B4-BE49-F238E27FC236}">
-                    <a16:creationId xmlns:a16="http://schemas.microsoft.com/office/drawing/2014/main" id="{766A9855-0679-5B83-254A-27677CF3797D}"/>
-                  </a:ext>
-                </a:extLst>
-              </p:cNvPr>
-              <p:cNvPicPr>
-                <a:picLocks noChangeAspect="1"/>
-              </p:cNvPicPr>
-              <p:nvPr/>
-            </p:nvPicPr>
-            <p:blipFill>
-              <a:blip r:embed="rId9">
-                <a:extLst>
-                  <a:ext uri="{28A0092B-C50C-407E-A947-70E740481C1C}">
-                    <a14:useLocalDpi xmlns:a14="http://schemas.microsoft.com/office/drawing/2010/main" val="0"/>
-                  </a:ext>
-                  <a:ext uri="{96DAC541-7B7A-43D3-8B79-37D633B846F1}">
-                    <asvg:svgBlip xmlns:asvg="http://schemas.microsoft.com/office/drawing/2016/SVG/main" r:embed="rId10"/>
-                  </a:ext>
-                </a:extLst>
-              </a:blip>
-              <a:stretch>
-                <a:fillRect/>
-              </a:stretch>
-            </p:blipFill>
-            <p:spPr>
-              <a:xfrm>
-                <a:off x="2286000" y="8953500"/>
-                <a:ext cx="1524000" cy="1524000"/>
-              </a:xfrm>
-              <a:prstGeom prst="rect">
-                <a:avLst/>
-              </a:prstGeom>
-            </p:spPr>
-          </p:pic>
-        </p:grpSp>
-        <p:grpSp>
-          <p:nvGrpSpPr>
-            <p:cNvPr id="36" name="Group 35">
-              <a:extLst>
-                <a:ext uri="{FF2B5EF4-FFF2-40B4-BE49-F238E27FC236}">
-                  <a16:creationId xmlns:a16="http://schemas.microsoft.com/office/drawing/2014/main" id="{1D56EBF8-5843-79F9-CFB5-7A475C96CF13}"/>
-                </a:ext>
-              </a:extLst>
-            </p:cNvPr>
-            <p:cNvGrpSpPr/>
-            <p:nvPr/>
-          </p:nvGrpSpPr>
-          <p:grpSpPr>
-            <a:xfrm>
-              <a:off x="10820400" y="8953500"/>
-              <a:ext cx="3962400" cy="1524000"/>
-              <a:chOff x="-152400" y="8953500"/>
-              <a:chExt cx="3962400" cy="1524000"/>
-            </a:xfrm>
-          </p:grpSpPr>
-          <p:pic>
-            <p:nvPicPr>
-              <p:cNvPr id="40" name="Graphic 39" descr="Wave with solid fill">
-                <a:extLst>
-                  <a:ext uri="{FF2B5EF4-FFF2-40B4-BE49-F238E27FC236}">
-                    <a16:creationId xmlns:a16="http://schemas.microsoft.com/office/drawing/2014/main" id="{FB23E508-64DA-A555-DDFE-33D7DBA36A74}"/>
-                  </a:ext>
-                </a:extLst>
-              </p:cNvPr>
-              <p:cNvPicPr>
-                <a:picLocks noChangeAspect="1"/>
-              </p:cNvPicPr>
-              <p:nvPr/>
-            </p:nvPicPr>
-            <p:blipFill>
-              <a:blip r:embed="rId9">
-                <a:extLst>
-                  <a:ext uri="{28A0092B-C50C-407E-A947-70E740481C1C}">
-                    <a14:useLocalDpi xmlns:a14="http://schemas.microsoft.com/office/drawing/2010/main" val="0"/>
-                  </a:ext>
-                  <a:ext uri="{96DAC541-7B7A-43D3-8B79-37D633B846F1}">
-                    <asvg:svgBlip xmlns:asvg="http://schemas.microsoft.com/office/drawing/2016/SVG/main" r:embed="rId10"/>
-                  </a:ext>
-                </a:extLst>
-              </a:blip>
-              <a:stretch>
-                <a:fillRect/>
-              </a:stretch>
-            </p:blipFill>
-            <p:spPr>
-              <a:xfrm>
-                <a:off x="-152400" y="8953500"/>
-                <a:ext cx="1524000" cy="1524000"/>
-              </a:xfrm>
-              <a:prstGeom prst="rect">
-                <a:avLst/>
-              </a:prstGeom>
-            </p:spPr>
-          </p:pic>
-          <p:pic>
-            <p:nvPicPr>
-              <p:cNvPr id="42" name="Graphic 41" descr="Wave with solid fill">
-                <a:extLst>
-                  <a:ext uri="{FF2B5EF4-FFF2-40B4-BE49-F238E27FC236}">
-                    <a16:creationId xmlns:a16="http://schemas.microsoft.com/office/drawing/2014/main" id="{EE57B816-911D-DFCF-9745-57D2C054811D}"/>
-                  </a:ext>
-                </a:extLst>
-              </p:cNvPr>
-              <p:cNvPicPr>
-                <a:picLocks noChangeAspect="1"/>
-              </p:cNvPicPr>
-              <p:nvPr/>
-            </p:nvPicPr>
-            <p:blipFill>
-              <a:blip r:embed="rId9">
-                <a:extLst>
-                  <a:ext uri="{28A0092B-C50C-407E-A947-70E740481C1C}">
-                    <a14:useLocalDpi xmlns:a14="http://schemas.microsoft.com/office/drawing/2010/main" val="0"/>
-                  </a:ext>
-                  <a:ext uri="{96DAC541-7B7A-43D3-8B79-37D633B846F1}">
-                    <asvg:svgBlip xmlns:asvg="http://schemas.microsoft.com/office/drawing/2016/SVG/main" r:embed="rId10"/>
-                  </a:ext>
-                </a:extLst>
-              </a:blip>
-              <a:stretch>
-                <a:fillRect/>
-              </a:stretch>
-            </p:blipFill>
-            <p:spPr>
-              <a:xfrm>
-                <a:off x="1066800" y="8953500"/>
-                <a:ext cx="1524000" cy="1524000"/>
-              </a:xfrm>
-              <a:prstGeom prst="rect">
-                <a:avLst/>
-              </a:prstGeom>
-            </p:spPr>
-          </p:pic>
-          <p:pic>
-            <p:nvPicPr>
-              <p:cNvPr id="43" name="Graphic 42" descr="Wave with solid fill">
-                <a:extLst>
-                  <a:ext uri="{FF2B5EF4-FFF2-40B4-BE49-F238E27FC236}">
-                    <a16:creationId xmlns:a16="http://schemas.microsoft.com/office/drawing/2014/main" id="{FF8AE157-12BE-B51E-715D-A58062261F07}"/>
-                  </a:ext>
-                </a:extLst>
-              </p:cNvPr>
-              <p:cNvPicPr>
-                <a:picLocks noChangeAspect="1"/>
-              </p:cNvPicPr>
-              <p:nvPr/>
-            </p:nvPicPr>
-            <p:blipFill>
-              <a:blip r:embed="rId9">
-                <a:extLst>
-                  <a:ext uri="{28A0092B-C50C-407E-A947-70E740481C1C}">
-                    <a14:useLocalDpi xmlns:a14="http://schemas.microsoft.com/office/drawing/2010/main" val="0"/>
-                  </a:ext>
-                  <a:ext uri="{96DAC541-7B7A-43D3-8B79-37D633B846F1}">
-                    <asvg:svgBlip xmlns:asvg="http://schemas.microsoft.com/office/drawing/2016/SVG/main" r:embed="rId10"/>
-                  </a:ext>
-                </a:extLst>
-              </a:blip>
-              <a:stretch>
-                <a:fillRect/>
-              </a:stretch>
-            </p:blipFill>
-            <p:spPr>
-              <a:xfrm>
-                <a:off x="2286000" y="8953500"/>
-                <a:ext cx="1524000" cy="1524000"/>
-              </a:xfrm>
-              <a:prstGeom prst="rect">
-                <a:avLst/>
-              </a:prstGeom>
-            </p:spPr>
-          </p:pic>
-        </p:grpSp>
-        <p:grpSp>
-          <p:nvGrpSpPr>
-            <p:cNvPr id="37" name="Group 36">
-              <a:extLst>
-                <a:ext uri="{FF2B5EF4-FFF2-40B4-BE49-F238E27FC236}">
-                  <a16:creationId xmlns:a16="http://schemas.microsoft.com/office/drawing/2014/main" id="{28757428-B68F-0EA0-9C06-E2CB410A68E0}"/>
-                </a:ext>
-              </a:extLst>
-            </p:cNvPr>
-            <p:cNvGrpSpPr/>
-            <p:nvPr/>
-          </p:nvGrpSpPr>
-          <p:grpSpPr>
-            <a:xfrm>
-              <a:off x="14478000" y="8953500"/>
-              <a:ext cx="2743200" cy="1524000"/>
-              <a:chOff x="-152400" y="8953500"/>
-              <a:chExt cx="2743200" cy="1524000"/>
-            </a:xfrm>
-          </p:grpSpPr>
-          <p:pic>
-            <p:nvPicPr>
-              <p:cNvPr id="38" name="Graphic 37" descr="Wave with solid fill">
-                <a:extLst>
-                  <a:ext uri="{FF2B5EF4-FFF2-40B4-BE49-F238E27FC236}">
-                    <a16:creationId xmlns:a16="http://schemas.microsoft.com/office/drawing/2014/main" id="{758EF3D3-C345-6D28-F887-DF865209E12F}"/>
-                  </a:ext>
-                </a:extLst>
-              </p:cNvPr>
-              <p:cNvPicPr>
-                <a:picLocks noChangeAspect="1"/>
-              </p:cNvPicPr>
-              <p:nvPr/>
-            </p:nvPicPr>
-            <p:blipFill>
-              <a:blip r:embed="rId9">
-                <a:extLst>
-                  <a:ext uri="{28A0092B-C50C-407E-A947-70E740481C1C}">
-                    <a14:useLocalDpi xmlns:a14="http://schemas.microsoft.com/office/drawing/2010/main" val="0"/>
-                  </a:ext>
-                  <a:ext uri="{96DAC541-7B7A-43D3-8B79-37D633B846F1}">
-                    <asvg:svgBlip xmlns:asvg="http://schemas.microsoft.com/office/drawing/2016/SVG/main" r:embed="rId10"/>
-                  </a:ext>
-                </a:extLst>
-              </a:blip>
-              <a:stretch>
-                <a:fillRect/>
-              </a:stretch>
-            </p:blipFill>
-            <p:spPr>
-              <a:xfrm>
-                <a:off x="-152400" y="8953500"/>
-                <a:ext cx="1524000" cy="1524000"/>
-              </a:xfrm>
-              <a:prstGeom prst="rect">
-                <a:avLst/>
-              </a:prstGeom>
-            </p:spPr>
-          </p:pic>
-          <p:pic>
-            <p:nvPicPr>
-              <p:cNvPr id="39" name="Graphic 38" descr="Wave with solid fill">
-                <a:extLst>
-                  <a:ext uri="{FF2B5EF4-FFF2-40B4-BE49-F238E27FC236}">
-                    <a16:creationId xmlns:a16="http://schemas.microsoft.com/office/drawing/2014/main" id="{F843E152-3E6E-CC10-0123-CB579B545CC0}"/>
-                  </a:ext>
-                </a:extLst>
-              </p:cNvPr>
-              <p:cNvPicPr>
-                <a:picLocks noChangeAspect="1"/>
-              </p:cNvPicPr>
-              <p:nvPr/>
-            </p:nvPicPr>
-            <p:blipFill>
-              <a:blip r:embed="rId9">
-                <a:extLst>
-                  <a:ext uri="{28A0092B-C50C-407E-A947-70E740481C1C}">
-                    <a14:useLocalDpi xmlns:a14="http://schemas.microsoft.com/office/drawing/2010/main" val="0"/>
-                  </a:ext>
-                  <a:ext uri="{96DAC541-7B7A-43D3-8B79-37D633B846F1}">
-                    <asvg:svgBlip xmlns:asvg="http://schemas.microsoft.com/office/drawing/2016/SVG/main" r:embed="rId10"/>
-                  </a:ext>
-                </a:extLst>
-              </a:blip>
-              <a:stretch>
-                <a:fillRect/>
-              </a:stretch>
-            </p:blipFill>
-            <p:spPr>
-              <a:xfrm>
-                <a:off x="1066800" y="8953500"/>
-                <a:ext cx="1524000" cy="1524000"/>
-              </a:xfrm>
-              <a:prstGeom prst="rect">
-                <a:avLst/>
-              </a:prstGeom>
-            </p:spPr>
-          </p:pic>
-        </p:grpSp>
-      </p:grpSp>
-      <p:pic>
-        <p:nvPicPr>
-          <p:cNvPr id="31" name="Picture 30" descr="A drawing of a coffee cup&#10;&#10;Description automatically generated">
-            <a:extLst>
-              <a:ext uri="{FF2B5EF4-FFF2-40B4-BE49-F238E27FC236}">
-                <a16:creationId xmlns:a16="http://schemas.microsoft.com/office/drawing/2014/main" id="{8BF65B07-F5BA-582C-C7EA-B380653B287A}"/>
-              </a:ext>
-            </a:extLst>
-          </p:cNvPr>
-          <p:cNvPicPr>
-            <a:picLocks noChangeAspect="1"/>
-          </p:cNvPicPr>
-          <p:nvPr/>
-        </p:nvPicPr>
-        <p:blipFill rotWithShape="1">
-          <a:blip r:embed="rId11">
-            <a:extLst>
-              <a:ext uri="{28A0092B-C50C-407E-A947-70E740481C1C}">
-                <a14:useLocalDpi xmlns:a14="http://schemas.microsoft.com/office/drawing/2010/main" val="0"/>
-              </a:ext>
-            </a:extLst>
-          </a:blip>
-          <a:srcRect l="23062" t="9972" r="24297" b="5135"/>
-          <a:stretch/>
-        </p:blipFill>
-        <p:spPr>
-          <a:xfrm>
-            <a:off x="4523961" y="4000500"/>
-            <a:ext cx="2181639" cy="2636759"/>
-          </a:xfrm>
-          <a:prstGeom prst="flowChartManualOperation">
-            <a:avLst/>
-          </a:prstGeom>
-        </p:spPr>
-      </p:pic>
     </p:spTree>
     <p:extLst>
       <p:ext uri="{BB962C8B-B14F-4D97-AF65-F5344CB8AC3E}">
-        <p14:creationId xmlns:p14="http://schemas.microsoft.com/office/powerpoint/2010/main" val="3272754172"/>
+        <p14:creationId xmlns:p14="http://schemas.microsoft.com/office/powerpoint/2010/main" val="1668395206"/>
       </p:ext>
     </p:extLst>
   </p:cSld>
@@ -40324,30 +39522,7 @@
 </a:theme>
 </file>
 
-<file path=ppt/webextensions/webextension1.xml><?xml version="1.0" encoding="utf-8"?>
-<we:webextension xmlns:we="http://schemas.microsoft.com/office/webextensions/webextension/2010/11" id="{0282B0EB-8AF5-CF4D-B1E2-6EA897342324}">
-  <we:reference id="wa200001661" version="2.1.0.2" store="en-US" storeType="OMEX"/>
-  <we:alternateReferences>
-    <we:reference id="WA200001661" version="2.1.0.2" store="WA200001661" storeType="OMEX"/>
-  </we:alternateReferences>
-  <we:properties>
-    <we:property name="time" value="1200"/>
-  </we:properties>
-  <we:bindings/>
-  <we:snapshot xmlns:r="http://schemas.openxmlformats.org/officeDocument/2006/relationships" r:embed="rId1"/>
-</we:webextension>
-</file>
-
 <file path=customXml/item1.xml><?xml version="1.0" encoding="utf-8"?>
-<?mso-contentType ?>
-<FormTemplates xmlns="http://schemas.microsoft.com/sharepoint/v3/contenttype/forms">
-  <Display>DocumentLibraryForm</Display>
-  <Edit>DocumentLibraryForm</Edit>
-  <New>DocumentLibraryForm</New>
-</FormTemplates>
-</file>
-
-<file path=customXml/item2.xml><?xml version="1.0" encoding="utf-8"?>
 <ct:contentTypeSchema xmlns:ct="http://schemas.microsoft.com/office/2006/metadata/contentType" xmlns:ma="http://schemas.microsoft.com/office/2006/metadata/properties/metaAttributes" ct:_="" ma:_="" ma:contentTypeName="Document" ma:contentTypeID="0x010100338C0C0DDBC9B742BC44458BFD432381" ma:contentTypeVersion="16" ma:contentTypeDescription="Create a new document." ma:contentTypeScope="" ma:versionID="9e3a3b9664c02b87506af07230493c03">
   <xsd:schema xmlns:xsd="http://www.w3.org/2001/XMLSchema" xmlns:xs="http://www.w3.org/2001/XMLSchema" xmlns:p="http://schemas.microsoft.com/office/2006/metadata/properties" xmlns:ns2="b30be232-03ea-456c-8192-b7ea3ce3ddcd" xmlns:ns3="c12dc4f0-a365-46b3-9e07-9aae8de5ba6f" targetNamespace="http://schemas.microsoft.com/office/2006/metadata/properties" ma:root="true" ma:fieldsID="97668ca7a1f544c2cd9291a5bcfce177" ns2:_="" ns3:_="">
     <xsd:import namespace="b30be232-03ea-456c-8192-b7ea3ce3ddcd"/>
@@ -40590,6 +39765,15 @@
 </ct:contentTypeSchema>
 </file>
 
+<file path=customXml/item2.xml><?xml version="1.0" encoding="utf-8"?>
+<?mso-contentType ?>
+<FormTemplates xmlns="http://schemas.microsoft.com/sharepoint/v3/contenttype/forms">
+  <Display>DocumentLibraryForm</Display>
+  <Edit>DocumentLibraryForm</Edit>
+  <New>DocumentLibraryForm</New>
+</FormTemplates>
+</file>
+
 <file path=customXml/item3.xml><?xml version="1.0" encoding="utf-8"?>
 <p:properties xmlns:p="http://schemas.microsoft.com/office/2006/metadata/properties" xmlns:xsi="http://www.w3.org/2001/XMLSchema-instance" xmlns:pc="http://schemas.microsoft.com/office/infopath/2007/PartnerControls">
   <documentManagement>
@@ -40602,14 +39786,6 @@
 </file>
 
 <file path=customXml/itemProps1.xml><?xml version="1.0" encoding="utf-8"?>
-<ds:datastoreItem xmlns:ds="http://schemas.openxmlformats.org/officeDocument/2006/customXml" ds:itemID="{62192324-B2BD-44ED-9189-FD50B4E08E52}">
-  <ds:schemaRefs>
-    <ds:schemaRef ds:uri="http://schemas.microsoft.com/sharepoint/v3/contenttype/forms"/>
-  </ds:schemaRefs>
-</ds:datastoreItem>
-</file>
-
-<file path=customXml/itemProps2.xml><?xml version="1.0" encoding="utf-8"?>
 <ds:datastoreItem xmlns:ds="http://schemas.openxmlformats.org/officeDocument/2006/customXml" ds:itemID="{B307509C-F6F5-45A5-8F96-BB1A9C2DDFA4}">
   <ds:schemaRefs>
     <ds:schemaRef ds:uri="http://schemas.microsoft.com/office/2006/metadata/contentType"/>
@@ -40624,6 +39800,14 @@
     <ds:schemaRef ds:uri="http://purl.org/dc/elements/1.1/"/>
     <ds:schemaRef ds:uri="http://purl.org/dc/terms/"/>
     <ds:schemaRef ds:uri="http://schemas.microsoft.com/internal/obd"/>
+  </ds:schemaRefs>
+</ds:datastoreItem>
+</file>
+
+<file path=customXml/itemProps2.xml><?xml version="1.0" encoding="utf-8"?>
+<ds:datastoreItem xmlns:ds="http://schemas.openxmlformats.org/officeDocument/2006/customXml" ds:itemID="{62192324-B2BD-44ED-9189-FD50B4E08E52}">
+  <ds:schemaRefs>
+    <ds:schemaRef ds:uri="http://schemas.microsoft.com/sharepoint/v3/contenttype/forms"/>
   </ds:schemaRefs>
 </ds:datastoreItem>
 </file>

</xml_diff>

<commit_message>
menti slide question numbers added
</commit_message>
<xml_diff>
--- a/Slides/FHDS_Data_Analysis_Part3.pptx
+++ b/Slides/FHDS_Data_Analysis_Part3.pptx
@@ -413,7 +413,7 @@
           <a:p>
             <a:fld id="{B7268E1E-0E44-426D-905E-8AD9B19D2182}" type="datetimeFigureOut">
               <a:rPr lang="cs-CZ" smtClean="0"/>
-              <a:t>30.05.2024</a:t>
+              <a:t>03.06.2024</a:t>
             </a:fld>
             <a:endParaRPr lang="cs-CZ"/>
           </a:p>
@@ -3848,7 +3848,7 @@
             <a:fld id="{1D8BD707-D9CF-40AE-B4C6-C98DA3205C09}" type="datetimeFigureOut">
               <a:rPr lang="en-US" smtClean="0"/>
               <a:pPr/>
-              <a:t>5/30/24</a:t>
+              <a:t>6/3/24</a:t>
             </a:fld>
             <a:endParaRPr lang="en-US"/>
           </a:p>
@@ -4013,7 +4013,7 @@
             <a:fld id="{1D8BD707-D9CF-40AE-B4C6-C98DA3205C09}" type="datetimeFigureOut">
               <a:rPr lang="en-US" smtClean="0"/>
               <a:pPr/>
-              <a:t>5/30/24</a:t>
+              <a:t>6/3/24</a:t>
             </a:fld>
             <a:endParaRPr lang="en-US"/>
           </a:p>
@@ -4188,7 +4188,7 @@
             <a:fld id="{1D8BD707-D9CF-40AE-B4C6-C98DA3205C09}" type="datetimeFigureOut">
               <a:rPr lang="en-US" smtClean="0"/>
               <a:pPr/>
-              <a:t>5/30/24</a:t>
+              <a:t>6/3/24</a:t>
             </a:fld>
             <a:endParaRPr lang="en-US"/>
           </a:p>
@@ -4353,7 +4353,7 @@
             <a:fld id="{1D8BD707-D9CF-40AE-B4C6-C98DA3205C09}" type="datetimeFigureOut">
               <a:rPr lang="en-US" smtClean="0"/>
               <a:pPr/>
-              <a:t>5/30/24</a:t>
+              <a:t>6/3/24</a:t>
             </a:fld>
             <a:endParaRPr lang="en-US"/>
           </a:p>
@@ -4595,7 +4595,7 @@
             <a:fld id="{1D8BD707-D9CF-40AE-B4C6-C98DA3205C09}" type="datetimeFigureOut">
               <a:rPr lang="en-US" smtClean="0"/>
               <a:pPr/>
-              <a:t>5/30/24</a:t>
+              <a:t>6/3/24</a:t>
             </a:fld>
             <a:endParaRPr lang="en-US"/>
           </a:p>
@@ -4877,7 +4877,7 @@
             <a:fld id="{1D8BD707-D9CF-40AE-B4C6-C98DA3205C09}" type="datetimeFigureOut">
               <a:rPr lang="en-US" smtClean="0"/>
               <a:pPr/>
-              <a:t>5/30/24</a:t>
+              <a:t>6/3/24</a:t>
             </a:fld>
             <a:endParaRPr lang="en-US"/>
           </a:p>
@@ -5293,7 +5293,7 @@
             <a:fld id="{1D8BD707-D9CF-40AE-B4C6-C98DA3205C09}" type="datetimeFigureOut">
               <a:rPr lang="en-US" smtClean="0"/>
               <a:pPr/>
-              <a:t>5/30/24</a:t>
+              <a:t>6/3/24</a:t>
             </a:fld>
             <a:endParaRPr lang="en-US"/>
           </a:p>
@@ -5407,7 +5407,7 @@
             <a:fld id="{1D8BD707-D9CF-40AE-B4C6-C98DA3205C09}" type="datetimeFigureOut">
               <a:rPr lang="en-US" smtClean="0"/>
               <a:pPr/>
-              <a:t>5/30/24</a:t>
+              <a:t>6/3/24</a:t>
             </a:fld>
             <a:endParaRPr lang="en-US"/>
           </a:p>
@@ -5499,7 +5499,7 @@
             <a:fld id="{1D8BD707-D9CF-40AE-B4C6-C98DA3205C09}" type="datetimeFigureOut">
               <a:rPr lang="en-US" smtClean="0"/>
               <a:pPr/>
-              <a:t>5/30/24</a:t>
+              <a:t>6/3/24</a:t>
             </a:fld>
             <a:endParaRPr lang="en-US"/>
           </a:p>
@@ -5771,7 +5771,7 @@
             <a:fld id="{1D8BD707-D9CF-40AE-B4C6-C98DA3205C09}" type="datetimeFigureOut">
               <a:rPr lang="en-US" smtClean="0"/>
               <a:pPr/>
-              <a:t>5/30/24</a:t>
+              <a:t>6/3/24</a:t>
             </a:fld>
             <a:endParaRPr lang="en-US"/>
           </a:p>
@@ -6020,7 +6020,7 @@
             <a:fld id="{1D8BD707-D9CF-40AE-B4C6-C98DA3205C09}" type="datetimeFigureOut">
               <a:rPr lang="en-US" smtClean="0"/>
               <a:pPr/>
-              <a:t>5/30/24</a:t>
+              <a:t>6/3/24</a:t>
             </a:fld>
             <a:endParaRPr lang="en-US"/>
           </a:p>
@@ -6228,7 +6228,7 @@
             <a:fld id="{1D8BD707-D9CF-40AE-B4C6-C98DA3205C09}" type="datetimeFigureOut">
               <a:rPr lang="en-US" smtClean="0"/>
               <a:pPr/>
-              <a:t>5/30/24</a:t>
+              <a:t>6/3/24</a:t>
             </a:fld>
             <a:endParaRPr lang="en-US"/>
           </a:p>
@@ -25443,8 +25443,8 @@
         </p:nvSpPr>
         <p:spPr>
           <a:xfrm>
-            <a:off x="9144000" y="3543300"/>
-            <a:ext cx="7187251" cy="1404359"/>
+            <a:off x="8750774" y="3739141"/>
+            <a:ext cx="7187251" cy="2096856"/>
           </a:xfrm>
           <a:prstGeom prst="rect">
             <a:avLst/>
@@ -25463,10 +25463,23 @@
               </a:lnSpc>
             </a:pPr>
             <a:r>
+              <a:rPr lang="en-US" sz="3000" b="1" dirty="0">
+                <a:latin typeface="Montserrat" pitchFamily="2" charset="77"/>
+              </a:rPr>
+              <a:t>Q9-Q11:</a:t>
+            </a:r>
+          </a:p>
+          <a:p>
+            <a:pPr>
+              <a:lnSpc>
+                <a:spcPct val="150000"/>
+              </a:lnSpc>
+            </a:pPr>
+            <a:r>
               <a:rPr lang="en-US" sz="3000" dirty="0">
                 <a:latin typeface="Montserrat" pitchFamily="2" charset="77"/>
               </a:rPr>
-              <a:t>Have you used any of the models we’ve talked about in this section?</a:t>
+              <a:t>A couple of questions about data analysis and models.</a:t>
             </a:r>
             <a:endParaRPr lang="en-US" sz="3200" b="1" dirty="0"/>
           </a:p>
@@ -38491,6 +38504,17 @@
 </file>
 
 <file path=customXml/item1.xml><?xml version="1.0" encoding="utf-8"?>
+<p:properties xmlns:p="http://schemas.microsoft.com/office/2006/metadata/properties" xmlns:xsi="http://www.w3.org/2001/XMLSchema-instance" xmlns:pc="http://schemas.microsoft.com/office/infopath/2007/PartnerControls">
+  <documentManagement>
+    <TaxCatchAll xmlns="c12dc4f0-a365-46b3-9e07-9aae8de5ba6f" xsi:nil="true"/>
+    <lcf76f155ced4ddcb4097134ff3c332f xmlns="b30be232-03ea-456c-8192-b7ea3ce3ddcd">
+      <Terms xmlns="http://schemas.microsoft.com/office/infopath/2007/PartnerControls"/>
+    </lcf76f155ced4ddcb4097134ff3c332f>
+  </documentManagement>
+</p:properties>
+</file>
+
+<file path=customXml/item2.xml><?xml version="1.0" encoding="utf-8"?>
 <?mso-contentType ?>
 <FormTemplates xmlns="http://schemas.microsoft.com/sharepoint/v3/contenttype/forms">
   <Display>DocumentLibraryForm</Display>
@@ -38499,7 +38523,7 @@
 </FormTemplates>
 </file>
 
-<file path=customXml/item2.xml><?xml version="1.0" encoding="utf-8"?>
+<file path=customXml/item3.xml><?xml version="1.0" encoding="utf-8"?>
 <ct:contentTypeSchema xmlns:ct="http://schemas.microsoft.com/office/2006/metadata/contentType" xmlns:ma="http://schemas.microsoft.com/office/2006/metadata/properties/metaAttributes" ct:_="" ma:_="" ma:contentTypeName="Document" ma:contentTypeID="0x010100338C0C0DDBC9B742BC44458BFD432381" ma:contentTypeVersion="16" ma:contentTypeDescription="Create a new document." ma:contentTypeScope="" ma:versionID="9e3a3b9664c02b87506af07230493c03">
   <xsd:schema xmlns:xsd="http://www.w3.org/2001/XMLSchema" xmlns:xs="http://www.w3.org/2001/XMLSchema" xmlns:p="http://schemas.microsoft.com/office/2006/metadata/properties" xmlns:ns2="b30be232-03ea-456c-8192-b7ea3ce3ddcd" xmlns:ns3="c12dc4f0-a365-46b3-9e07-9aae8de5ba6f" targetNamespace="http://schemas.microsoft.com/office/2006/metadata/properties" ma:root="true" ma:fieldsID="97668ca7a1f544c2cd9291a5bcfce177" ns2:_="" ns3:_="">
     <xsd:import namespace="b30be232-03ea-456c-8192-b7ea3ce3ddcd"/>
@@ -38742,18 +38766,24 @@
 </ct:contentTypeSchema>
 </file>
 
-<file path=customXml/item3.xml><?xml version="1.0" encoding="utf-8"?>
-<p:properties xmlns:p="http://schemas.microsoft.com/office/2006/metadata/properties" xmlns:xsi="http://www.w3.org/2001/XMLSchema-instance" xmlns:pc="http://schemas.microsoft.com/office/infopath/2007/PartnerControls">
-  <documentManagement>
-    <TaxCatchAll xmlns="c12dc4f0-a365-46b3-9e07-9aae8de5ba6f" xsi:nil="true"/>
-    <lcf76f155ced4ddcb4097134ff3c332f xmlns="b30be232-03ea-456c-8192-b7ea3ce3ddcd">
-      <Terms xmlns="http://schemas.microsoft.com/office/infopath/2007/PartnerControls"/>
-    </lcf76f155ced4ddcb4097134ff3c332f>
-  </documentManagement>
-</p:properties>
+<file path=customXml/itemProps1.xml><?xml version="1.0" encoding="utf-8"?>
+<ds:datastoreItem xmlns:ds="http://schemas.openxmlformats.org/officeDocument/2006/customXml" ds:itemID="{7ADE2A51-02EA-4AA8-8B29-AE3416880B26}">
+  <ds:schemaRefs>
+    <ds:schemaRef ds:uri="c12dc4f0-a365-46b3-9e07-9aae8de5ba6f"/>
+    <ds:schemaRef ds:uri="http://purl.org/dc/terms/"/>
+    <ds:schemaRef ds:uri="http://schemas.openxmlformats.org/package/2006/metadata/core-properties"/>
+    <ds:schemaRef ds:uri="http://www.w3.org/XML/1998/namespace"/>
+    <ds:schemaRef ds:uri="b30be232-03ea-456c-8192-b7ea3ce3ddcd"/>
+    <ds:schemaRef ds:uri="http://schemas.microsoft.com/office/2006/documentManagement/types"/>
+    <ds:schemaRef ds:uri="http://purl.org/dc/elements/1.1/"/>
+    <ds:schemaRef ds:uri="http://schemas.microsoft.com/office/infopath/2007/PartnerControls"/>
+    <ds:schemaRef ds:uri="http://schemas.microsoft.com/office/2006/metadata/properties"/>
+    <ds:schemaRef ds:uri="http://purl.org/dc/dcmitype/"/>
+  </ds:schemaRefs>
+</ds:datastoreItem>
 </file>
 
-<file path=customXml/itemProps1.xml><?xml version="1.0" encoding="utf-8"?>
+<file path=customXml/itemProps2.xml><?xml version="1.0" encoding="utf-8"?>
 <ds:datastoreItem xmlns:ds="http://schemas.openxmlformats.org/officeDocument/2006/customXml" ds:itemID="{62192324-B2BD-44ED-9189-FD50B4E08E52}">
   <ds:schemaRefs>
     <ds:schemaRef ds:uri="http://schemas.microsoft.com/sharepoint/v3/contenttype/forms"/>
@@ -38761,7 +38791,7 @@
 </ds:datastoreItem>
 </file>
 
-<file path=customXml/itemProps2.xml><?xml version="1.0" encoding="utf-8"?>
+<file path=customXml/itemProps3.xml><?xml version="1.0" encoding="utf-8"?>
 <ds:datastoreItem xmlns:ds="http://schemas.openxmlformats.org/officeDocument/2006/customXml" ds:itemID="{B307509C-F6F5-45A5-8F96-BB1A9C2DDFA4}">
   <ds:schemaRefs>
     <ds:schemaRef ds:uri="http://schemas.microsoft.com/office/2006/metadata/contentType"/>
@@ -38780,23 +38810,6 @@
 </ds:datastoreItem>
 </file>
 
-<file path=customXml/itemProps3.xml><?xml version="1.0" encoding="utf-8"?>
-<ds:datastoreItem xmlns:ds="http://schemas.openxmlformats.org/officeDocument/2006/customXml" ds:itemID="{7ADE2A51-02EA-4AA8-8B29-AE3416880B26}">
-  <ds:schemaRefs>
-    <ds:schemaRef ds:uri="c12dc4f0-a365-46b3-9e07-9aae8de5ba6f"/>
-    <ds:schemaRef ds:uri="http://purl.org/dc/terms/"/>
-    <ds:schemaRef ds:uri="http://schemas.openxmlformats.org/package/2006/metadata/core-properties"/>
-    <ds:schemaRef ds:uri="http://www.w3.org/XML/1998/namespace"/>
-    <ds:schemaRef ds:uri="b30be232-03ea-456c-8192-b7ea3ce3ddcd"/>
-    <ds:schemaRef ds:uri="http://schemas.microsoft.com/office/2006/documentManagement/types"/>
-    <ds:schemaRef ds:uri="http://purl.org/dc/elements/1.1/"/>
-    <ds:schemaRef ds:uri="http://schemas.microsoft.com/office/infopath/2007/PartnerControls"/>
-    <ds:schemaRef ds:uri="http://schemas.microsoft.com/office/2006/metadata/properties"/>
-    <ds:schemaRef ds:uri="http://purl.org/dc/dcmitype/"/>
-  </ds:schemaRefs>
-</ds:datastoreItem>
-</file>
-
 <file path=docMetadata/LabelInfo.xml><?xml version="1.0" encoding="utf-8"?>
 <clbl:labelList xmlns:clbl="http://schemas.microsoft.com/office/2020/mipLabelMetadata">
   <clbl:label id="{6a2630e2-1ac5-455e-8217-0156b1936a76}" enabled="1" method="Standard" siteId="{a3927f91-cda1-4696-af89-8c9f1ceffa91}" contentBits="0" removed="0"/>

</xml_diff>